<commit_message>
updaing week 9 and 10
</commit_message>
<xml_diff>
--- a/Week_9/Week 9 Slides.pptx
+++ b/Week_9/Week 9 Slides.pptx
@@ -113,6 +113,11 @@
       </a:defRPr>
     </a:lvl9pPr>
   </p:defaultTextStyle>
+  <p:extLst>
+    <p:ext uri="{EFAFB233-063F-42B5-8137-9DF3F51BA10A}">
+      <p15:sldGuideLst xmlns:p15="http://schemas.microsoft.com/office/powerpoint/2012/main"/>
+    </p:ext>
+  </p:extLst>
 </p:presentation>
 </file>
 
@@ -161,7 +166,6 @@
               <a:rPr lang="en-US"/>
               <a:t>Click to edit Master title style</a:t>
             </a:r>
-            <a:endParaRPr lang="en-US"/>
           </a:p>
         </p:txBody>
       </p:sp>
@@ -226,7 +230,6 @@
               <a:rPr lang="en-US"/>
               <a:t>Click to edit Master subtitle style</a:t>
             </a:r>
-            <a:endParaRPr lang="en-US"/>
           </a:p>
         </p:txBody>
       </p:sp>
@@ -247,7 +250,7 @@
           <a:p>
             <a:fld id="{D3E96019-5EB8-4A49-99CD-F084636E2E5D}" type="datetimeFigureOut">
               <a:rPr lang="en-US" smtClean="0"/>
-              <a:t>3/18/2017</a:t>
+              <a:t>3/20/2017</a:t>
             </a:fld>
             <a:endParaRPr lang="en-US"/>
           </a:p>
@@ -344,7 +347,6 @@
               <a:rPr lang="en-US"/>
               <a:t>Click to edit Master title style</a:t>
             </a:r>
-            <a:endParaRPr lang="en-US"/>
           </a:p>
         </p:txBody>
       </p:sp>
@@ -396,7 +398,6 @@
               <a:rPr lang="en-US"/>
               <a:t>Fifth level</a:t>
             </a:r>
-            <a:endParaRPr lang="en-US"/>
           </a:p>
         </p:txBody>
       </p:sp>
@@ -417,7 +418,7 @@
           <a:p>
             <a:fld id="{D3E96019-5EB8-4A49-99CD-F084636E2E5D}" type="datetimeFigureOut">
               <a:rPr lang="en-US" smtClean="0"/>
-              <a:t>3/18/2017</a:t>
+              <a:t>3/20/2017</a:t>
             </a:fld>
             <a:endParaRPr lang="en-US"/>
           </a:p>
@@ -519,7 +520,6 @@
               <a:rPr lang="en-US"/>
               <a:t>Click to edit Master title style</a:t>
             </a:r>
-            <a:endParaRPr lang="en-US"/>
           </a:p>
         </p:txBody>
       </p:sp>
@@ -576,7 +576,6 @@
               <a:rPr lang="en-US"/>
               <a:t>Fifth level</a:t>
             </a:r>
-            <a:endParaRPr lang="en-US"/>
           </a:p>
         </p:txBody>
       </p:sp>
@@ -597,7 +596,7 @@
           <a:p>
             <a:fld id="{D3E96019-5EB8-4A49-99CD-F084636E2E5D}" type="datetimeFigureOut">
               <a:rPr lang="en-US" smtClean="0"/>
-              <a:t>3/18/2017</a:t>
+              <a:t>3/20/2017</a:t>
             </a:fld>
             <a:endParaRPr lang="en-US"/>
           </a:p>
@@ -694,7 +693,6 @@
               <a:rPr lang="en-US"/>
               <a:t>Click to edit Master title style</a:t>
             </a:r>
-            <a:endParaRPr lang="en-US"/>
           </a:p>
         </p:txBody>
       </p:sp>
@@ -746,7 +744,6 @@
               <a:rPr lang="en-US"/>
               <a:t>Fifth level</a:t>
             </a:r>
-            <a:endParaRPr lang="en-US"/>
           </a:p>
         </p:txBody>
       </p:sp>
@@ -767,7 +764,7 @@
           <a:p>
             <a:fld id="{D3E96019-5EB8-4A49-99CD-F084636E2E5D}" type="datetimeFigureOut">
               <a:rPr lang="en-US" smtClean="0"/>
-              <a:t>3/18/2017</a:t>
+              <a:t>3/20/2017</a:t>
             </a:fld>
             <a:endParaRPr lang="en-US"/>
           </a:p>
@@ -873,7 +870,6 @@
               <a:rPr lang="en-US"/>
               <a:t>Click to edit Master title style</a:t>
             </a:r>
-            <a:endParaRPr lang="en-US"/>
           </a:p>
         </p:txBody>
       </p:sp>
@@ -1013,7 +1009,7 @@
           <a:p>
             <a:fld id="{D3E96019-5EB8-4A49-99CD-F084636E2E5D}" type="datetimeFigureOut">
               <a:rPr lang="en-US" smtClean="0"/>
-              <a:t>3/18/2017</a:t>
+              <a:t>3/20/2017</a:t>
             </a:fld>
             <a:endParaRPr lang="en-US"/>
           </a:p>
@@ -1110,7 +1106,6 @@
               <a:rPr lang="en-US"/>
               <a:t>Click to edit Master title style</a:t>
             </a:r>
-            <a:endParaRPr lang="en-US"/>
           </a:p>
         </p:txBody>
       </p:sp>
@@ -1167,7 +1162,6 @@
               <a:rPr lang="en-US"/>
               <a:t>Fifth level</a:t>
             </a:r>
-            <a:endParaRPr lang="en-US"/>
           </a:p>
         </p:txBody>
       </p:sp>
@@ -1224,7 +1218,6 @@
               <a:rPr lang="en-US"/>
               <a:t>Fifth level</a:t>
             </a:r>
-            <a:endParaRPr lang="en-US"/>
           </a:p>
         </p:txBody>
       </p:sp>
@@ -1245,7 +1238,7 @@
           <a:p>
             <a:fld id="{D3E96019-5EB8-4A49-99CD-F084636E2E5D}" type="datetimeFigureOut">
               <a:rPr lang="en-US" smtClean="0"/>
-              <a:t>3/18/2017</a:t>
+              <a:t>3/20/2017</a:t>
             </a:fld>
             <a:endParaRPr lang="en-US"/>
           </a:p>
@@ -1347,7 +1340,6 @@
               <a:rPr lang="en-US"/>
               <a:t>Click to edit Master title style</a:t>
             </a:r>
-            <a:endParaRPr lang="en-US"/>
           </a:p>
         </p:txBody>
       </p:sp>
@@ -1469,7 +1461,6 @@
               <a:rPr lang="en-US"/>
               <a:t>Fifth level</a:t>
             </a:r>
-            <a:endParaRPr lang="en-US"/>
           </a:p>
         </p:txBody>
       </p:sp>
@@ -1591,7 +1582,6 @@
               <a:rPr lang="en-US"/>
               <a:t>Fifth level</a:t>
             </a:r>
-            <a:endParaRPr lang="en-US"/>
           </a:p>
         </p:txBody>
       </p:sp>
@@ -1612,7 +1602,7 @@
           <a:p>
             <a:fld id="{D3E96019-5EB8-4A49-99CD-F084636E2E5D}" type="datetimeFigureOut">
               <a:rPr lang="en-US" smtClean="0"/>
-              <a:t>3/18/2017</a:t>
+              <a:t>3/20/2017</a:t>
             </a:fld>
             <a:endParaRPr lang="en-US"/>
           </a:p>
@@ -1709,7 +1699,6 @@
               <a:rPr lang="en-US"/>
               <a:t>Click to edit Master title style</a:t>
             </a:r>
-            <a:endParaRPr lang="en-US"/>
           </a:p>
         </p:txBody>
       </p:sp>
@@ -1730,7 +1719,7 @@
           <a:p>
             <a:fld id="{D3E96019-5EB8-4A49-99CD-F084636E2E5D}" type="datetimeFigureOut">
               <a:rPr lang="en-US" smtClean="0"/>
-              <a:t>3/18/2017</a:t>
+              <a:t>3/20/2017</a:t>
             </a:fld>
             <a:endParaRPr lang="en-US"/>
           </a:p>
@@ -1825,7 +1814,7 @@
           <a:p>
             <a:fld id="{D3E96019-5EB8-4A49-99CD-F084636E2E5D}" type="datetimeFigureOut">
               <a:rPr lang="en-US" smtClean="0"/>
-              <a:t>3/18/2017</a:t>
+              <a:t>3/20/2017</a:t>
             </a:fld>
             <a:endParaRPr lang="en-US"/>
           </a:p>
@@ -1931,7 +1920,6 @@
               <a:rPr lang="en-US"/>
               <a:t>Click to edit Master title style</a:t>
             </a:r>
-            <a:endParaRPr lang="en-US"/>
           </a:p>
         </p:txBody>
       </p:sp>
@@ -2016,7 +2004,6 @@
               <a:rPr lang="en-US"/>
               <a:t>Fifth level</a:t>
             </a:r>
-            <a:endParaRPr lang="en-US"/>
           </a:p>
         </p:txBody>
       </p:sp>
@@ -2102,7 +2089,7 @@
           <a:p>
             <a:fld id="{D3E96019-5EB8-4A49-99CD-F084636E2E5D}" type="datetimeFigureOut">
               <a:rPr lang="en-US" smtClean="0"/>
-              <a:t>3/18/2017</a:t>
+              <a:t>3/20/2017</a:t>
             </a:fld>
             <a:endParaRPr lang="en-US"/>
           </a:p>
@@ -2208,7 +2195,6 @@
               <a:rPr lang="en-US"/>
               <a:t>Click to edit Master title style</a:t>
             </a:r>
-            <a:endParaRPr lang="en-US"/>
           </a:p>
         </p:txBody>
       </p:sp>
@@ -2355,7 +2341,7 @@
           <a:p>
             <a:fld id="{D3E96019-5EB8-4A49-99CD-F084636E2E5D}" type="datetimeFigureOut">
               <a:rPr lang="en-US" smtClean="0"/>
-              <a:t>3/18/2017</a:t>
+              <a:t>3/20/2017</a:t>
             </a:fld>
             <a:endParaRPr lang="en-US"/>
           </a:p>
@@ -2467,7 +2453,6 @@
               <a:rPr lang="en-US"/>
               <a:t>Click to edit Master title style</a:t>
             </a:r>
-            <a:endParaRPr lang="en-US"/>
           </a:p>
         </p:txBody>
       </p:sp>
@@ -2529,7 +2514,6 @@
               <a:rPr lang="en-US"/>
               <a:t>Fifth level</a:t>
             </a:r>
-            <a:endParaRPr lang="en-US"/>
           </a:p>
         </p:txBody>
       </p:sp>
@@ -2568,7 +2552,7 @@
           <a:p>
             <a:fld id="{D3E96019-5EB8-4A49-99CD-F084636E2E5D}" type="datetimeFigureOut">
               <a:rPr lang="en-US" smtClean="0"/>
-              <a:t>3/18/2017</a:t>
+              <a:t>3/20/2017</a:t>
             </a:fld>
             <a:endParaRPr lang="en-US"/>
           </a:p>
@@ -3265,25 +3249,29 @@
           </a:p>
         </p:txBody>
       </p:sp>
-      <p:sp>
-        <p:nvSpPr>
-          <p:cNvPr id="3" name="Content Placeholder 2"/>
-          <p:cNvSpPr>
-            <a:spLocks noGrp="1"/>
-          </p:cNvSpPr>
-          <p:nvPr>
-            <p:ph idx="1"/>
-          </p:nvPr>
-        </p:nvSpPr>
-        <p:spPr/>
-        <p:txBody>
-          <a:bodyPr/>
-          <a:lstStyle/>
-          <a:p>
-            <a:endParaRPr lang="en-US"/>
-          </a:p>
-        </p:txBody>
-      </p:sp>
+      <p:pic>
+        <p:nvPicPr>
+          <p:cNvPr id="4" name="Picture 3"/>
+          <p:cNvPicPr>
+            <a:picLocks noChangeAspect="1"/>
+          </p:cNvPicPr>
+          <p:nvPr/>
+        </p:nvPicPr>
+        <p:blipFill rotWithShape="1">
+          <a:blip r:embed="rId2"/>
+          <a:srcRect l="7873" t="10097" r="19074"/>
+          <a:stretch/>
+        </p:blipFill>
+        <p:spPr>
+          <a:xfrm>
+            <a:off x="1740877" y="1433879"/>
+            <a:ext cx="8906608" cy="5880100"/>
+          </a:xfrm>
+          <a:prstGeom prst="rect">
+            <a:avLst/>
+          </a:prstGeom>
+        </p:spPr>
+      </p:pic>
     </p:spTree>
     <p:extLst>
       <p:ext uri="{BB962C8B-B14F-4D97-AF65-F5344CB8AC3E}">
@@ -3341,25 +3329,29 @@
           </a:p>
         </p:txBody>
       </p:sp>
-      <p:sp>
-        <p:nvSpPr>
-          <p:cNvPr id="3" name="Content Placeholder 2"/>
-          <p:cNvSpPr>
-            <a:spLocks noGrp="1"/>
-          </p:cNvSpPr>
-          <p:nvPr>
-            <p:ph idx="1"/>
-          </p:nvPr>
-        </p:nvSpPr>
-        <p:spPr/>
-        <p:txBody>
-          <a:bodyPr/>
-          <a:lstStyle/>
-          <a:p>
-            <a:endParaRPr lang="en-US"/>
-          </a:p>
-        </p:txBody>
-      </p:sp>
+      <p:pic>
+        <p:nvPicPr>
+          <p:cNvPr id="4" name="Picture 3"/>
+          <p:cNvPicPr>
+            <a:picLocks noChangeAspect="1"/>
+          </p:cNvPicPr>
+          <p:nvPr/>
+        </p:nvPicPr>
+        <p:blipFill rotWithShape="1">
+          <a:blip r:embed="rId2"/>
+          <a:srcRect l="8294" t="9369" r="9134"/>
+          <a:stretch/>
+        </p:blipFill>
+        <p:spPr>
+          <a:xfrm>
+            <a:off x="1062403" y="1307854"/>
+            <a:ext cx="10067194" cy="5927725"/>
+          </a:xfrm>
+          <a:prstGeom prst="rect">
+            <a:avLst/>
+          </a:prstGeom>
+        </p:spPr>
+      </p:pic>
     </p:spTree>
     <p:extLst>
       <p:ext uri="{BB962C8B-B14F-4D97-AF65-F5344CB8AC3E}">
@@ -3652,7 +3644,65 @@
           <a:bodyPr/>
           <a:lstStyle/>
           <a:p>
-            <a:endParaRPr lang="en-US"/>
+            <a:r>
+              <a:rPr lang="en-US" dirty="0"/>
+              <a:t>Module of </a:t>
+            </a:r>
+            <a:r>
+              <a:rPr lang="en-US" dirty="0" err="1"/>
+              <a:t>Arcpy</a:t>
+            </a:r>
+            <a:endParaRPr lang="en-US" dirty="0"/>
+          </a:p>
+          <a:p>
+            <a:r>
+              <a:rPr lang="en-US" dirty="0"/>
+              <a:t>Has to be imported</a:t>
+            </a:r>
+          </a:p>
+          <a:p>
+            <a:r>
+              <a:rPr lang="en-US" dirty="0"/>
+              <a:t>Best practice:</a:t>
+            </a:r>
+          </a:p>
+          <a:p>
+            <a:pPr marL="0" indent="0">
+              <a:buNone/>
+            </a:pPr>
+            <a:r>
+              <a:rPr lang="en-US" dirty="0"/>
+              <a:t>&gt;&gt; import </a:t>
+            </a:r>
+            <a:r>
+              <a:rPr lang="en-US" dirty="0" err="1"/>
+              <a:t>arcpy</a:t>
+            </a:r>
+            <a:endParaRPr lang="en-US" dirty="0"/>
+          </a:p>
+          <a:p>
+            <a:pPr marL="0" indent="0">
+              <a:buNone/>
+            </a:pPr>
+            <a:r>
+              <a:rPr lang="en-US" dirty="0"/>
+              <a:t>&gt;&gt; from arcpy.sa import *</a:t>
+            </a:r>
+          </a:p>
+          <a:p>
+            <a:r>
+              <a:rPr lang="en-US" dirty="0"/>
+              <a:t>Do not do:</a:t>
+            </a:r>
+          </a:p>
+          <a:p>
+            <a:pPr marL="0" indent="0">
+              <a:buNone/>
+            </a:pPr>
+            <a:r>
+              <a:rPr lang="en-US" dirty="0"/>
+              <a:t>&gt;&gt; import arcpy.sa</a:t>
+            </a:r>
           </a:p>
         </p:txBody>
       </p:sp>
@@ -3723,7 +3773,104 @@
           <a:bodyPr/>
           <a:lstStyle/>
           <a:p>
-            <a:endParaRPr lang="en-US"/>
+            <a:pPr marL="0" indent="0">
+              <a:buNone/>
+            </a:pPr>
+            <a:r>
+              <a:rPr lang="en-US" dirty="0"/>
+              <a:t>&gt;&gt; from arcpy.sa import *</a:t>
+            </a:r>
+          </a:p>
+          <a:p>
+            <a:pPr marL="0" indent="0">
+              <a:buNone/>
+            </a:pPr>
+            <a:r>
+              <a:rPr lang="en-US" dirty="0"/>
+              <a:t>&gt;&gt; </a:t>
+            </a:r>
+            <a:r>
+              <a:rPr lang="en-US" dirty="0" err="1"/>
+              <a:t>inDem</a:t>
+            </a:r>
+            <a:r>
+              <a:rPr lang="en-US" dirty="0"/>
+              <a:t> = </a:t>
+            </a:r>
+            <a:r>
+              <a:rPr lang="en-US" dirty="0" err="1"/>
+              <a:t>r”C</a:t>
+            </a:r>
+            <a:r>
+              <a:rPr lang="en-US" dirty="0"/>
+              <a:t>:\Student\</a:t>
+            </a:r>
+            <a:r>
+              <a:rPr lang="en-US" dirty="0" err="1"/>
+              <a:t>elevation.tif</a:t>
+            </a:r>
+            <a:r>
+              <a:rPr lang="en-US" dirty="0"/>
+              <a:t>”</a:t>
+            </a:r>
+          </a:p>
+          <a:p>
+            <a:pPr marL="0" indent="0">
+              <a:buNone/>
+            </a:pPr>
+            <a:r>
+              <a:rPr lang="en-US" dirty="0"/>
+              <a:t>&gt;&gt; </a:t>
+            </a:r>
+            <a:r>
+              <a:rPr lang="en-US" dirty="0" err="1"/>
+              <a:t>slopeRas</a:t>
+            </a:r>
+            <a:r>
+              <a:rPr lang="en-US" dirty="0"/>
+              <a:t> = Slope(</a:t>
+            </a:r>
+            <a:r>
+              <a:rPr lang="en-US" dirty="0" err="1"/>
+              <a:t>inDem</a:t>
+            </a:r>
+            <a:r>
+              <a:rPr lang="en-US" dirty="0"/>
+              <a:t>)</a:t>
+            </a:r>
+          </a:p>
+          <a:p>
+            <a:pPr marL="0" indent="0">
+              <a:buNone/>
+            </a:pPr>
+            <a:r>
+              <a:rPr lang="en-US" dirty="0"/>
+              <a:t>&gt;&gt; </a:t>
+            </a:r>
+            <a:r>
+              <a:rPr lang="en-US" dirty="0" err="1"/>
+              <a:t>slopeRas.save</a:t>
+            </a:r>
+            <a:r>
+              <a:rPr lang="en-US" dirty="0"/>
+              <a:t>(</a:t>
+            </a:r>
+            <a:r>
+              <a:rPr lang="en-US" dirty="0" err="1"/>
+              <a:t>r”C</a:t>
+            </a:r>
+            <a:r>
+              <a:rPr lang="en-US" dirty="0"/>
+              <a:t>:\Student\</a:t>
+            </a:r>
+            <a:r>
+              <a:rPr lang="en-US" dirty="0" err="1"/>
+              <a:t>slope.tif</a:t>
+            </a:r>
+            <a:r>
+              <a:rPr lang="en-US" dirty="0"/>
+              <a:t>”)</a:t>
+            </a:r>
           </a:p>
         </p:txBody>
       </p:sp>

</xml_diff>

<commit_message>
updating week 9 and 10
</commit_message>
<xml_diff>
--- a/Week_9/Week 9 Slides.pptx
+++ b/Week_9/Week 9 Slides.pptx
@@ -15,6 +15,7 @@
     <p:sldId id="263" r:id="rId9"/>
     <p:sldId id="264" r:id="rId10"/>
     <p:sldId id="265" r:id="rId11"/>
+    <p:sldId id="266" r:id="rId12"/>
   </p:sldIdLst>
   <p:sldSz cx="12192000" cy="6858000"/>
   <p:notesSz cx="6858000" cy="9144000"/>
@@ -250,7 +251,7 @@
           <a:p>
             <a:fld id="{D3E96019-5EB8-4A49-99CD-F084636E2E5D}" type="datetimeFigureOut">
               <a:rPr lang="en-US" smtClean="0"/>
-              <a:t>3/20/2017</a:t>
+              <a:t>3/21/2017</a:t>
             </a:fld>
             <a:endParaRPr lang="en-US"/>
           </a:p>
@@ -418,7 +419,7 @@
           <a:p>
             <a:fld id="{D3E96019-5EB8-4A49-99CD-F084636E2E5D}" type="datetimeFigureOut">
               <a:rPr lang="en-US" smtClean="0"/>
-              <a:t>3/20/2017</a:t>
+              <a:t>3/21/2017</a:t>
             </a:fld>
             <a:endParaRPr lang="en-US"/>
           </a:p>
@@ -596,7 +597,7 @@
           <a:p>
             <a:fld id="{D3E96019-5EB8-4A49-99CD-F084636E2E5D}" type="datetimeFigureOut">
               <a:rPr lang="en-US" smtClean="0"/>
-              <a:t>3/20/2017</a:t>
+              <a:t>3/21/2017</a:t>
             </a:fld>
             <a:endParaRPr lang="en-US"/>
           </a:p>
@@ -764,7 +765,7 @@
           <a:p>
             <a:fld id="{D3E96019-5EB8-4A49-99CD-F084636E2E5D}" type="datetimeFigureOut">
               <a:rPr lang="en-US" smtClean="0"/>
-              <a:t>3/20/2017</a:t>
+              <a:t>3/21/2017</a:t>
             </a:fld>
             <a:endParaRPr lang="en-US"/>
           </a:p>
@@ -1009,7 +1010,7 @@
           <a:p>
             <a:fld id="{D3E96019-5EB8-4A49-99CD-F084636E2E5D}" type="datetimeFigureOut">
               <a:rPr lang="en-US" smtClean="0"/>
-              <a:t>3/20/2017</a:t>
+              <a:t>3/21/2017</a:t>
             </a:fld>
             <a:endParaRPr lang="en-US"/>
           </a:p>
@@ -1238,7 +1239,7 @@
           <a:p>
             <a:fld id="{D3E96019-5EB8-4A49-99CD-F084636E2E5D}" type="datetimeFigureOut">
               <a:rPr lang="en-US" smtClean="0"/>
-              <a:t>3/20/2017</a:t>
+              <a:t>3/21/2017</a:t>
             </a:fld>
             <a:endParaRPr lang="en-US"/>
           </a:p>
@@ -1602,7 +1603,7 @@
           <a:p>
             <a:fld id="{D3E96019-5EB8-4A49-99CD-F084636E2E5D}" type="datetimeFigureOut">
               <a:rPr lang="en-US" smtClean="0"/>
-              <a:t>3/20/2017</a:t>
+              <a:t>3/21/2017</a:t>
             </a:fld>
             <a:endParaRPr lang="en-US"/>
           </a:p>
@@ -1719,7 +1720,7 @@
           <a:p>
             <a:fld id="{D3E96019-5EB8-4A49-99CD-F084636E2E5D}" type="datetimeFigureOut">
               <a:rPr lang="en-US" smtClean="0"/>
-              <a:t>3/20/2017</a:t>
+              <a:t>3/21/2017</a:t>
             </a:fld>
             <a:endParaRPr lang="en-US"/>
           </a:p>
@@ -1814,7 +1815,7 @@
           <a:p>
             <a:fld id="{D3E96019-5EB8-4A49-99CD-F084636E2E5D}" type="datetimeFigureOut">
               <a:rPr lang="en-US" smtClean="0"/>
-              <a:t>3/20/2017</a:t>
+              <a:t>3/21/2017</a:t>
             </a:fld>
             <a:endParaRPr lang="en-US"/>
           </a:p>
@@ -2089,7 +2090,7 @@
           <a:p>
             <a:fld id="{D3E96019-5EB8-4A49-99CD-F084636E2E5D}" type="datetimeFigureOut">
               <a:rPr lang="en-US" smtClean="0"/>
-              <a:t>3/20/2017</a:t>
+              <a:t>3/21/2017</a:t>
             </a:fld>
             <a:endParaRPr lang="en-US"/>
           </a:p>
@@ -2341,7 +2342,7 @@
           <a:p>
             <a:fld id="{D3E96019-5EB8-4A49-99CD-F084636E2E5D}" type="datetimeFigureOut">
               <a:rPr lang="en-US" smtClean="0"/>
-              <a:t>3/20/2017</a:t>
+              <a:t>3/21/2017</a:t>
             </a:fld>
             <a:endParaRPr lang="en-US"/>
           </a:p>
@@ -2552,7 +2553,7 @@
           <a:p>
             <a:fld id="{D3E96019-5EB8-4A49-99CD-F084636E2E5D}" type="datetimeFigureOut">
               <a:rPr lang="en-US" smtClean="0"/>
-              <a:t>3/20/2017</a:t>
+              <a:t>3/21/2017</a:t>
             </a:fld>
             <a:endParaRPr lang="en-US"/>
           </a:p>
@@ -3095,6 +3096,89 @@
 </p:sld>
 </file>
 
+<file path=ppt/slides/slide11.xml><?xml version="1.0" encoding="utf-8"?>
+<p:sld xmlns:a="http://schemas.openxmlformats.org/drawingml/2006/main" xmlns:r="http://schemas.openxmlformats.org/officeDocument/2006/relationships" xmlns:p="http://schemas.openxmlformats.org/presentationml/2006/main">
+  <p:cSld>
+    <p:spTree>
+      <p:nvGrpSpPr>
+        <p:cNvPr id="1" name=""/>
+        <p:cNvGrpSpPr/>
+        <p:nvPr/>
+      </p:nvGrpSpPr>
+      <p:grpSpPr>
+        <a:xfrm>
+          <a:off x="0" y="0"/>
+          <a:ext cx="0" cy="0"/>
+          <a:chOff x="0" y="0"/>
+          <a:chExt cx="0" cy="0"/>
+        </a:xfrm>
+      </p:grpSpPr>
+      <p:sp>
+        <p:nvSpPr>
+          <p:cNvPr id="4" name="Title 3"/>
+          <p:cNvSpPr>
+            <a:spLocks noGrp="1"/>
+          </p:cNvSpPr>
+          <p:nvPr>
+            <p:ph type="title"/>
+          </p:nvPr>
+        </p:nvSpPr>
+        <p:spPr/>
+        <p:txBody>
+          <a:bodyPr/>
+          <a:lstStyle/>
+          <a:p>
+            <a:r>
+              <a:rPr lang="en-US" dirty="0"/>
+              <a:t>Project and In-Class work	</a:t>
+            </a:r>
+          </a:p>
+        </p:txBody>
+      </p:sp>
+      <p:sp>
+        <p:nvSpPr>
+          <p:cNvPr id="5" name="Content Placeholder 4"/>
+          <p:cNvSpPr>
+            <a:spLocks noGrp="1"/>
+          </p:cNvSpPr>
+          <p:nvPr>
+            <p:ph idx="1"/>
+          </p:nvPr>
+        </p:nvSpPr>
+        <p:spPr/>
+        <p:txBody>
+          <a:bodyPr/>
+          <a:lstStyle/>
+          <a:p>
+            <a:r>
+              <a:rPr lang="en-US" dirty="0"/>
+              <a:t>Submit in-class work to Week 9 folder</a:t>
+            </a:r>
+          </a:p>
+          <a:p>
+            <a:endParaRPr lang="en-US" dirty="0"/>
+          </a:p>
+          <a:p>
+            <a:r>
+              <a:rPr lang="en-US" dirty="0"/>
+              <a:t>Project 2 is in Projects folder – Due Tuesday 4/4</a:t>
+            </a:r>
+          </a:p>
+        </p:txBody>
+      </p:sp>
+    </p:spTree>
+    <p:extLst>
+      <p:ext uri="{BB962C8B-B14F-4D97-AF65-F5344CB8AC3E}">
+        <p14:creationId xmlns:p14="http://schemas.microsoft.com/office/powerpoint/2010/main" val="3637934222"/>
+      </p:ext>
+    </p:extLst>
+  </p:cSld>
+  <p:clrMapOvr>
+    <a:masterClrMapping/>
+  </p:clrMapOvr>
+</p:sld>
+</file>
+
 <file path=ppt/slides/slide2.xml><?xml version="1.0" encoding="utf-8"?>
 <p:sld xmlns:a="http://schemas.openxmlformats.org/drawingml/2006/main" xmlns:r="http://schemas.openxmlformats.org/officeDocument/2006/relationships" xmlns:p="http://schemas.openxmlformats.org/presentationml/2006/main">
   <p:cSld>

</xml_diff>